<commit_message>
Got coverage for server working (I hope), updated tech demo presentation
</commit_message>
<xml_diff>
--- a/doc/Tech Demo.pptx
+++ b/doc/Tech Demo.pptx
@@ -204,7 +204,7 @@
           <a:p>
             <a:fld id="{520A387C-9C98-8A44-BEE6-65F2890D60BF}" type="datetimeFigureOut">
               <a:rPr lang="en-US" smtClean="0"/>
-              <a:t>11/8/10</a:t>
+              <a:t>11/11/10</a:t>
             </a:fld>
             <a:endParaRPr lang="en-US"/>
           </a:p>
@@ -664,7 +664,7 @@
           <a:p>
             <a:fld id="{216C5678-EE20-4FA5-88E2-6E0BD67A2E26}" type="datetime1">
               <a:rPr lang="en-US" smtClean="0"/>
-              <a:t>11/8/10</a:t>
+              <a:t>11/11/10</a:t>
             </a:fld>
             <a:endParaRPr lang="en-US" dirty="0"/>
           </a:p>
@@ -834,7 +834,7 @@
           <a:p>
             <a:fld id="{EA051B39-B140-43FE-96DB-472A2B59CE7C}" type="datetime1">
               <a:rPr lang="en-US" smtClean="0"/>
-              <a:t>11/8/10</a:t>
+              <a:t>11/11/10</a:t>
             </a:fld>
             <a:endParaRPr lang="en-US"/>
           </a:p>
@@ -1014,7 +1014,7 @@
           <a:p>
             <a:fld id="{DA600BB2-27C5-458B-ABCE-839C88CF47CE}" type="datetime1">
               <a:rPr lang="en-US" smtClean="0"/>
-              <a:t>11/8/10</a:t>
+              <a:t>11/11/10</a:t>
             </a:fld>
             <a:endParaRPr lang="en-US"/>
           </a:p>
@@ -1202,7 +1202,7 @@
           <a:p>
             <a:fld id="{B11D738E-8962-435F-8C43-147B8DD7E819}" type="datetime1">
               <a:rPr lang="en-US" smtClean="0"/>
-              <a:t>11/8/10</a:t>
+              <a:t>11/11/10</a:t>
             </a:fld>
             <a:endParaRPr lang="en-US"/>
           </a:p>
@@ -1469,7 +1469,7 @@
           <a:p>
             <a:fld id="{09CAEA93-55E7-4DA9-90C2-089A26EEFEC4}" type="datetime1">
               <a:rPr lang="en-US" smtClean="0"/>
-              <a:t>11/8/10</a:t>
+              <a:t>11/11/10</a:t>
             </a:fld>
             <a:endParaRPr lang="en-US"/>
           </a:p>
@@ -1822,7 +1822,7 @@
           <a:p>
             <a:fld id="{E34CF3C7-6809-4F39-BD67-A75817BDDE0A}" type="datetime1">
               <a:rPr lang="en-US" smtClean="0"/>
-              <a:t>11/8/10</a:t>
+              <a:t>11/11/10</a:t>
             </a:fld>
             <a:endParaRPr lang="en-US"/>
           </a:p>
@@ -2135,7 +2135,7 @@
           <a:p>
             <a:fld id="{F7EAEB24-CE78-465C-A726-91D0868FA48F}" type="datetime1">
               <a:rPr lang="en-US" smtClean="0"/>
-              <a:t>11/8/10</a:t>
+              <a:t>11/11/10</a:t>
             </a:fld>
             <a:endParaRPr lang="en-US"/>
           </a:p>
@@ -2367,7 +2367,7 @@
           <a:p>
             <a:fld id="{40BAADF0-1749-4E8B-9691-B44A5F8C0895}" type="datetime1">
               <a:rPr lang="en-US" smtClean="0"/>
-              <a:t>11/8/10</a:t>
+              <a:t>11/11/10</a:t>
             </a:fld>
             <a:endParaRPr lang="en-US"/>
           </a:p>
@@ -2462,7 +2462,7 @@
           <a:p>
             <a:fld id="{A8AF628A-A867-4937-BBE5-207DB6F9C51A}" type="datetime1">
               <a:rPr lang="en-US" smtClean="0"/>
-              <a:t>11/8/10</a:t>
+              <a:t>11/11/10</a:t>
             </a:fld>
             <a:endParaRPr lang="en-US"/>
           </a:p>
@@ -2755,7 +2755,7 @@
           <a:p>
             <a:fld id="{118BBB94-68E6-4675-A946-F1C5994EDBD7}" type="datetime1">
               <a:rPr lang="en-US" smtClean="0"/>
-              <a:t>11/8/10</a:t>
+              <a:t>11/11/10</a:t>
             </a:fld>
             <a:endParaRPr lang="en-US"/>
           </a:p>
@@ -3029,7 +3029,7 @@
           <a:p>
             <a:fld id="{DC3B8377-21E3-4835-B75D-4E2847E2750F}" type="datetime1">
               <a:rPr lang="en-US" smtClean="0"/>
-              <a:t>11/8/10</a:t>
+              <a:t>11/11/10</a:t>
             </a:fld>
             <a:endParaRPr lang="en-US"/>
           </a:p>
@@ -3244,7 +3244,7 @@
           <a:p>
             <a:fld id="{B0C4986D-6BE9-4264-908F-02DB36FD8D6C}" type="datetime1">
               <a:rPr lang="en-US" smtClean="0"/>
-              <a:t>11/8/10</a:t>
+              <a:t>11/11/10</a:t>
             </a:fld>
             <a:endParaRPr lang="en-US" dirty="0"/>
           </a:p>
@@ -3820,6 +3820,13 @@
   <p:clrMapOvr>
     <a:masterClrMapping/>
   </p:clrMapOvr>
+  <p:timing>
+    <p:tnLst>
+      <p:par>
+        <p:cTn xmlns:p14="http://schemas.microsoft.com/office/powerpoint/2010/main" id="1" dur="indefinite" restart="never" nodeType="tmRoot"/>
+      </p:par>
+    </p:tnLst>
+  </p:timing>
 </p:sld>
 </file>
 
@@ -4161,7 +4168,7 @@
                 <a:latin typeface="Monaco"/>
                 <a:cs typeface="Monaco"/>
               </a:rPr>
-              <a:t> x = </a:t>
+              <a:t> x = (Integer)</a:t>
             </a:r>
             <a:r>
               <a:rPr lang="en-US" sz="1800" dirty="0" err="1" smtClean="0">
@@ -4328,8 +4335,12 @@
           </a:p>
           <a:p>
             <a:r>
+              <a:rPr lang="en-US" smtClean="0"/>
+              <a:t>Python objects </a:t>
+            </a:r>
+            <a:r>
               <a:rPr lang="en-US" dirty="0" smtClean="0"/>
-              <a:t>Objects serialized with </a:t>
+              <a:t>serialized with </a:t>
             </a:r>
             <a:r>
               <a:rPr lang="en-US" dirty="0" err="1" smtClean="0"/>
@@ -4661,6 +4672,13 @@
   <p:clrMapOvr>
     <a:masterClrMapping/>
   </p:clrMapOvr>
+  <p:timing>
+    <p:tnLst>
+      <p:par>
+        <p:cTn xmlns:p14="http://schemas.microsoft.com/office/powerpoint/2010/main" id="1" dur="indefinite" restart="never" nodeType="tmRoot"/>
+      </p:par>
+    </p:tnLst>
+  </p:timing>
 </p:sld>
 </file>
 
@@ -4751,6 +4769,13 @@
   <p:clrMapOvr>
     <a:masterClrMapping/>
   </p:clrMapOvr>
+  <p:timing>
+    <p:tnLst>
+      <p:par>
+        <p:cTn xmlns:p14="http://schemas.microsoft.com/office/powerpoint/2010/main" id="1" dur="indefinite" restart="never" nodeType="tmRoot"/>
+      </p:par>
+    </p:tnLst>
+  </p:timing>
 </p:sld>
 </file>
 
@@ -4861,6 +4886,13 @@
   <p:clrMapOvr>
     <a:masterClrMapping/>
   </p:clrMapOvr>
+  <p:timing>
+    <p:tnLst>
+      <p:par>
+        <p:cTn xmlns:p14="http://schemas.microsoft.com/office/powerpoint/2010/main" id="1" dur="indefinite" restart="never" nodeType="tmRoot"/>
+      </p:par>
+    </p:tnLst>
+  </p:timing>
 </p:sld>
 </file>
 
@@ -5022,6 +5054,13 @@
   <p:clrMapOvr>
     <a:masterClrMapping/>
   </p:clrMapOvr>
+  <p:timing>
+    <p:tnLst>
+      <p:par>
+        <p:cTn xmlns:p14="http://schemas.microsoft.com/office/powerpoint/2010/main" id="1" dur="indefinite" restart="never" nodeType="tmRoot"/>
+      </p:par>
+    </p:tnLst>
+  </p:timing>
 </p:sld>
 </file>
 
@@ -5217,7 +5256,68 @@
               <a:rPr lang="en-US" dirty="0" smtClean="0">
                 <a:cs typeface="Century Gothic"/>
               </a:rPr>
-              <a:t> will automatically turn it into a property</a:t>
+              <a:t> will automatically turn it into a </a:t>
+            </a:r>
+            <a:r>
+              <a:rPr lang="en-US" dirty="0" smtClean="0">
+                <a:cs typeface="Century Gothic"/>
+              </a:rPr>
+              <a:t>property. </a:t>
+            </a:r>
+          </a:p>
+          <a:p>
+            <a:pPr lvl="1"/>
+            <a:r>
+              <a:rPr lang="en-US" dirty="0" smtClean="0">
+                <a:cs typeface="Century Gothic"/>
+              </a:rPr>
+              <a:t>So the Java </a:t>
+            </a:r>
+            <a:r>
+              <a:rPr lang="en-US" dirty="0" err="1" smtClean="0">
+                <a:latin typeface="Monaco"/>
+                <a:cs typeface="Monaco"/>
+              </a:rPr>
+              <a:t>bar.setFoo</a:t>
+            </a:r>
+            <a:r>
+              <a:rPr lang="en-US" dirty="0" smtClean="0">
+                <a:latin typeface="Monaco"/>
+                <a:cs typeface="Monaco"/>
+              </a:rPr>
+              <a:t>(5) </a:t>
+            </a:r>
+            <a:r>
+              <a:rPr lang="en-US" dirty="0" smtClean="0">
+                <a:cs typeface="Century Gothic"/>
+              </a:rPr>
+              <a:t>becomes </a:t>
+            </a:r>
+            <a:r>
+              <a:rPr lang="en-US" dirty="0" err="1" smtClean="0">
+                <a:latin typeface="Monaco"/>
+                <a:cs typeface="Monaco"/>
+              </a:rPr>
+              <a:t>bar.foo</a:t>
+            </a:r>
+            <a:r>
+              <a:rPr lang="en-US" dirty="0" smtClean="0">
+                <a:latin typeface="Monaco"/>
+                <a:cs typeface="Monaco"/>
+              </a:rPr>
+              <a:t> = 5 </a:t>
+            </a:r>
+            <a:r>
+              <a:rPr lang="en-US" dirty="0" smtClean="0">
+                <a:cs typeface="Century Gothic"/>
+              </a:rPr>
+              <a:t>in </a:t>
+            </a:r>
+            <a:r>
+              <a:rPr lang="en-US" dirty="0" err="1" smtClean="0">
+                <a:cs typeface="Century Gothic"/>
+              </a:rPr>
+              <a:t>Jython</a:t>
             </a:r>
             <a:endParaRPr lang="en-US" dirty="0">
               <a:cs typeface="Century Gothic"/>
@@ -5240,6 +5340,13 @@
   <p:clrMapOvr>
     <a:masterClrMapping/>
   </p:clrMapOvr>
+  <p:timing>
+    <p:tnLst>
+      <p:par>
+        <p:cTn xmlns:p14="http://schemas.microsoft.com/office/powerpoint/2010/main" id="1" dur="indefinite" restart="never" nodeType="tmRoot"/>
+      </p:par>
+    </p:tnLst>
+  </p:timing>
 </p:sld>
 </file>
 
@@ -5335,6 +5442,13 @@
   <p:clrMapOvr>
     <a:masterClrMapping/>
   </p:clrMapOvr>
+  <p:timing>
+    <p:tnLst>
+      <p:par>
+        <p:cTn xmlns:p14="http://schemas.microsoft.com/office/powerpoint/2010/main" id="1" dur="indefinite" restart="never" nodeType="tmRoot"/>
+      </p:par>
+    </p:tnLst>
+  </p:timing>
 </p:sld>
 </file>
 
@@ -5477,6 +5591,13 @@
   <p:clrMapOvr>
     <a:masterClrMapping/>
   </p:clrMapOvr>
+  <p:timing>
+    <p:tnLst>
+      <p:par>
+        <p:cTn xmlns:p14="http://schemas.microsoft.com/office/powerpoint/2010/main" id="1" dur="indefinite" restart="never" nodeType="tmRoot"/>
+      </p:par>
+    </p:tnLst>
+  </p:timing>
 </p:sld>
 </file>
 

</xml_diff>

<commit_message>
Added support for mouseClicked events and begin working on the image tool.
</commit_message>
<xml_diff>
--- a/doc/Tech Demo.pptx
+++ b/doc/Tech Demo.pptx
@@ -4654,10 +4654,16 @@
           <a:p>
             <a:r>
               <a:rPr lang="en-US" dirty="0" smtClean="0"/>
-              <a:t>Much less verbose than Java, C#, etc.</a:t>
-            </a:r>
-          </a:p>
-          <a:p>
+              <a:t>Much less verbose than Java, C#, </a:t>
+            </a:r>
+            <a:r>
+              <a:rPr lang="en-US" smtClean="0"/>
+              <a:t>etc</a:t>
+            </a:r>
+            <a:r>
+              <a:rPr lang="en-US" smtClean="0"/>
+              <a:t>.</a:t>
+            </a:r>
             <a:endParaRPr lang="en-US" dirty="0" smtClean="0"/>
           </a:p>
         </p:txBody>

</xml_diff>